<commit_message>
Update with simulations without LD loci
</commit_message>
<xml_diff>
--- a/supplementary/figures.pptx
+++ b/supplementary/figures.pptx
@@ -290,7 +290,8 @@
           <a:p>
             <a:fld id="{65430337-4FB4-4DFD-9867-85DD0B0AC0AB}" type="datetimeFigureOut">
               <a:rPr lang="en-US" smtClean="0"/>
-              <a:t>1/25/2017</a:t>
+              <a:pPr/>
+              <a:t>2/3/2017</a:t>
             </a:fld>
             <a:endParaRPr lang="en-US"/>
           </a:p>
@@ -332,6 +333,7 @@
           <a:p>
             <a:fld id="{9DB8B255-9375-441F-A621-1791BD0A3F94}" type="slidenum">
               <a:rPr lang="en-US" smtClean="0"/>
+              <a:pPr/>
               <a:t>‹#›</a:t>
             </a:fld>
             <a:endParaRPr lang="en-US"/>
@@ -455,7 +457,8 @@
           <a:p>
             <a:fld id="{65430337-4FB4-4DFD-9867-85DD0B0AC0AB}" type="datetimeFigureOut">
               <a:rPr lang="en-US" smtClean="0"/>
-              <a:t>1/25/2017</a:t>
+              <a:pPr/>
+              <a:t>2/3/2017</a:t>
             </a:fld>
             <a:endParaRPr lang="en-US"/>
           </a:p>
@@ -497,6 +500,7 @@
           <a:p>
             <a:fld id="{9DB8B255-9375-441F-A621-1791BD0A3F94}" type="slidenum">
               <a:rPr lang="en-US" smtClean="0"/>
+              <a:pPr/>
               <a:t>‹#›</a:t>
             </a:fld>
             <a:endParaRPr lang="en-US"/>
@@ -630,7 +634,8 @@
           <a:p>
             <a:fld id="{65430337-4FB4-4DFD-9867-85DD0B0AC0AB}" type="datetimeFigureOut">
               <a:rPr lang="en-US" smtClean="0"/>
-              <a:t>1/25/2017</a:t>
+              <a:pPr/>
+              <a:t>2/3/2017</a:t>
             </a:fld>
             <a:endParaRPr lang="en-US"/>
           </a:p>
@@ -672,6 +677,7 @@
           <a:p>
             <a:fld id="{9DB8B255-9375-441F-A621-1791BD0A3F94}" type="slidenum">
               <a:rPr lang="en-US" smtClean="0"/>
+              <a:pPr/>
               <a:t>‹#›</a:t>
             </a:fld>
             <a:endParaRPr lang="en-US"/>
@@ -795,7 +801,8 @@
           <a:p>
             <a:fld id="{65430337-4FB4-4DFD-9867-85DD0B0AC0AB}" type="datetimeFigureOut">
               <a:rPr lang="en-US" smtClean="0"/>
-              <a:t>1/25/2017</a:t>
+              <a:pPr/>
+              <a:t>2/3/2017</a:t>
             </a:fld>
             <a:endParaRPr lang="en-US"/>
           </a:p>
@@ -837,6 +844,7 @@
           <a:p>
             <a:fld id="{9DB8B255-9375-441F-A621-1791BD0A3F94}" type="slidenum">
               <a:rPr lang="en-US" smtClean="0"/>
+              <a:pPr/>
               <a:t>‹#›</a:t>
             </a:fld>
             <a:endParaRPr lang="en-US"/>
@@ -1036,7 +1044,8 @@
           <a:p>
             <a:fld id="{65430337-4FB4-4DFD-9867-85DD0B0AC0AB}" type="datetimeFigureOut">
               <a:rPr lang="en-US" smtClean="0"/>
-              <a:t>1/25/2017</a:t>
+              <a:pPr/>
+              <a:t>2/3/2017</a:t>
             </a:fld>
             <a:endParaRPr lang="en-US"/>
           </a:p>
@@ -1078,6 +1087,7 @@
           <a:p>
             <a:fld id="{9DB8B255-9375-441F-A621-1791BD0A3F94}" type="slidenum">
               <a:rPr lang="en-US" smtClean="0"/>
+              <a:pPr/>
               <a:t>‹#›</a:t>
             </a:fld>
             <a:endParaRPr lang="en-US"/>
@@ -1319,7 +1329,8 @@
           <a:p>
             <a:fld id="{65430337-4FB4-4DFD-9867-85DD0B0AC0AB}" type="datetimeFigureOut">
               <a:rPr lang="en-US" smtClean="0"/>
-              <a:t>1/25/2017</a:t>
+              <a:pPr/>
+              <a:t>2/3/2017</a:t>
             </a:fld>
             <a:endParaRPr lang="en-US"/>
           </a:p>
@@ -1361,6 +1372,7 @@
           <a:p>
             <a:fld id="{9DB8B255-9375-441F-A621-1791BD0A3F94}" type="slidenum">
               <a:rPr lang="en-US" smtClean="0"/>
+              <a:pPr/>
               <a:t>‹#›</a:t>
             </a:fld>
             <a:endParaRPr lang="en-US"/>
@@ -1736,7 +1748,8 @@
           <a:p>
             <a:fld id="{65430337-4FB4-4DFD-9867-85DD0B0AC0AB}" type="datetimeFigureOut">
               <a:rPr lang="en-US" smtClean="0"/>
-              <a:t>1/25/2017</a:t>
+              <a:pPr/>
+              <a:t>2/3/2017</a:t>
             </a:fld>
             <a:endParaRPr lang="en-US"/>
           </a:p>
@@ -1778,6 +1791,7 @@
           <a:p>
             <a:fld id="{9DB8B255-9375-441F-A621-1791BD0A3F94}" type="slidenum">
               <a:rPr lang="en-US" smtClean="0"/>
+              <a:pPr/>
               <a:t>‹#›</a:t>
             </a:fld>
             <a:endParaRPr lang="en-US"/>
@@ -1849,7 +1863,8 @@
           <a:p>
             <a:fld id="{65430337-4FB4-4DFD-9867-85DD0B0AC0AB}" type="datetimeFigureOut">
               <a:rPr lang="en-US" smtClean="0"/>
-              <a:t>1/25/2017</a:t>
+              <a:pPr/>
+              <a:t>2/3/2017</a:t>
             </a:fld>
             <a:endParaRPr lang="en-US"/>
           </a:p>
@@ -1891,6 +1906,7 @@
           <a:p>
             <a:fld id="{9DB8B255-9375-441F-A621-1791BD0A3F94}" type="slidenum">
               <a:rPr lang="en-US" smtClean="0"/>
+              <a:pPr/>
               <a:t>‹#›</a:t>
             </a:fld>
             <a:endParaRPr lang="en-US"/>
@@ -1939,7 +1955,8 @@
           <a:p>
             <a:fld id="{65430337-4FB4-4DFD-9867-85DD0B0AC0AB}" type="datetimeFigureOut">
               <a:rPr lang="en-US" smtClean="0"/>
-              <a:t>1/25/2017</a:t>
+              <a:pPr/>
+              <a:t>2/3/2017</a:t>
             </a:fld>
             <a:endParaRPr lang="en-US"/>
           </a:p>
@@ -1981,6 +1998,7 @@
           <a:p>
             <a:fld id="{9DB8B255-9375-441F-A621-1791BD0A3F94}" type="slidenum">
               <a:rPr lang="en-US" smtClean="0"/>
+              <a:pPr/>
               <a:t>‹#›</a:t>
             </a:fld>
             <a:endParaRPr lang="en-US"/>
@@ -2211,7 +2229,8 @@
           <a:p>
             <a:fld id="{65430337-4FB4-4DFD-9867-85DD0B0AC0AB}" type="datetimeFigureOut">
               <a:rPr lang="en-US" smtClean="0"/>
-              <a:t>1/25/2017</a:t>
+              <a:pPr/>
+              <a:t>2/3/2017</a:t>
             </a:fld>
             <a:endParaRPr lang="en-US"/>
           </a:p>
@@ -2253,6 +2272,7 @@
           <a:p>
             <a:fld id="{9DB8B255-9375-441F-A621-1791BD0A3F94}" type="slidenum">
               <a:rPr lang="en-US" smtClean="0"/>
+              <a:pPr/>
               <a:t>‹#›</a:t>
             </a:fld>
             <a:endParaRPr lang="en-US"/>
@@ -2459,7 +2479,8 @@
           <a:p>
             <a:fld id="{65430337-4FB4-4DFD-9867-85DD0B0AC0AB}" type="datetimeFigureOut">
               <a:rPr lang="en-US" smtClean="0"/>
-              <a:t>1/25/2017</a:t>
+              <a:pPr/>
+              <a:t>2/3/2017</a:t>
             </a:fld>
             <a:endParaRPr lang="en-US"/>
           </a:p>
@@ -2501,6 +2522,7 @@
           <a:p>
             <a:fld id="{9DB8B255-9375-441F-A621-1791BD0A3F94}" type="slidenum">
               <a:rPr lang="en-US" smtClean="0"/>
+              <a:pPr/>
               <a:t>‹#›</a:t>
             </a:fld>
             <a:endParaRPr lang="en-US"/>
@@ -2667,7 +2689,8 @@
           <a:p>
             <a:fld id="{65430337-4FB4-4DFD-9867-85DD0B0AC0AB}" type="datetimeFigureOut">
               <a:rPr lang="en-US" smtClean="0"/>
-              <a:t>1/25/2017</a:t>
+              <a:pPr/>
+              <a:t>2/3/2017</a:t>
             </a:fld>
             <a:endParaRPr lang="en-US"/>
           </a:p>
@@ -2745,6 +2768,7 @@
           <a:p>
             <a:fld id="{9DB8B255-9375-441F-A621-1791BD0A3F94}" type="slidenum">
               <a:rPr lang="en-US" smtClean="0"/>
+              <a:pPr/>
               <a:t>‹#›</a:t>
             </a:fld>
             <a:endParaRPr lang="en-US"/>
@@ -4322,7 +4346,31 @@
                         <a:schemeClr val="tx1"/>
                       </a:solidFill>
                     </a:rPr>
-                    <a:t>2 causal SNPs from each locus</a:t>
+                    <a:t>Up to 4 </a:t>
+                  </a:r>
+                  <a:r>
+                    <a:rPr lang="en-US" sz="2000" dirty="0" smtClean="0">
+                      <a:solidFill>
+                        <a:schemeClr val="tx1"/>
+                      </a:solidFill>
+                    </a:rPr>
+                    <a:t>causal </a:t>
+                  </a:r>
+                  <a:r>
+                    <a:rPr lang="en-US" sz="2000" dirty="0" smtClean="0">
+                      <a:solidFill>
+                        <a:schemeClr val="tx1"/>
+                      </a:solidFill>
+                    </a:rPr>
+                    <a:t>SNPs in each </a:t>
+                  </a:r>
+                  <a:r>
+                    <a:rPr lang="en-US" sz="2000" dirty="0" smtClean="0">
+                      <a:solidFill>
+                        <a:schemeClr val="tx1"/>
+                      </a:solidFill>
+                    </a:rPr>
+                    <a:t>locus</a:t>
                   </a:r>
                   <a:endParaRPr lang="en-US" sz="2000" dirty="0">
                     <a:solidFill>
@@ -4382,7 +4430,15 @@
                         <a:schemeClr val="tx1"/>
                       </a:solidFill>
                     </a:rPr>
-                    <a:t>120 causal loci</a:t>
+                    <a:t>100 </a:t>
+                  </a:r>
+                  <a:r>
+                    <a:rPr lang="en-US" sz="2000" dirty="0" smtClean="0">
+                      <a:solidFill>
+                        <a:schemeClr val="tx1"/>
+                      </a:solidFill>
+                    </a:rPr>
+                    <a:t>causal loci</a:t>
                   </a:r>
                   <a:endParaRPr lang="en-US" sz="2000" dirty="0">
                     <a:solidFill>

</xml_diff>